<commit_message>
filled in some more bare bones
</commit_message>
<xml_diff>
--- a/survey topic/SDNOpenFlow.pptx
+++ b/survey topic/SDNOpenFlow.pptx
@@ -5367,13 +5367,13 @@
   <p:clrMapOvr>
     <a:masterClrMapping/>
   </p:clrMapOvr>
-  <mc:AlternateContent xmlns:mc="http://schemas.openxmlformats.org/markup-compatibility/2006">
-    <mc:Choice xmlns:p14="http://schemas.microsoft.com/office/powerpoint/2010/main" Requires="p14">
+  <mc:AlternateContent xmlns:mc="http://schemas.openxmlformats.org/markup-compatibility/2006" xmlns:p14="http://schemas.microsoft.com/office/powerpoint/2010/main">
+    <mc:Choice Requires="p14">
       <p:transition spd="med" p14:dur="700">
         <p:fade/>
       </p:transition>
     </mc:Choice>
-    <mc:Fallback>
+    <mc:Fallback xmlns="">
       <p:transition spd="med">
         <p:fade/>
       </p:transition>
@@ -5519,7 +5519,10 @@
           <a:bodyPr/>
           <a:lstStyle/>
           <a:p>
-            <a:endParaRPr lang="en-US"/>
+            <a:endParaRPr lang="en-US" dirty="0" smtClean="0"/>
+          </a:p>
+          <a:p>
+            <a:endParaRPr lang="en-US" dirty="0"/>
           </a:p>
         </p:txBody>
       </p:sp>
@@ -5579,13 +5582,13 @@
   <p:clrMapOvr>
     <a:masterClrMapping/>
   </p:clrMapOvr>
-  <mc:AlternateContent xmlns:mc="http://schemas.openxmlformats.org/markup-compatibility/2006">
-    <mc:Choice xmlns:p14="http://schemas.microsoft.com/office/powerpoint/2010/main" Requires="p14">
+  <mc:AlternateContent xmlns:mc="http://schemas.openxmlformats.org/markup-compatibility/2006" xmlns:p14="http://schemas.microsoft.com/office/powerpoint/2010/main">
+    <mc:Choice Requires="p14">
       <p:transition spd="med" p14:dur="700">
         <p:fade/>
       </p:transition>
     </mc:Choice>
-    <mc:Fallback>
+    <mc:Fallback xmlns="">
       <p:transition spd="med">
         <p:fade/>
       </p:transition>
@@ -5626,7 +5629,24 @@
           <a:bodyPr/>
           <a:lstStyle/>
           <a:p>
-            <a:endParaRPr lang="en-US"/>
+            <a:r>
+              <a:rPr lang="en-US" dirty="0" smtClean="0"/>
+              <a:t>Routing Problems</a:t>
+            </a:r>
+          </a:p>
+          <a:p>
+            <a:pPr lvl="1"/>
+            <a:r>
+              <a:rPr lang="en-US" dirty="0" smtClean="0"/>
+              <a:t>Count to infinity</a:t>
+            </a:r>
+          </a:p>
+          <a:p>
+            <a:r>
+              <a:rPr lang="en-US" dirty="0" smtClean="0"/>
+              <a:t>Network Topology</a:t>
+            </a:r>
+            <a:endParaRPr lang="en-US" dirty="0"/>
           </a:p>
         </p:txBody>
       </p:sp>
@@ -5686,13 +5706,13 @@
   <p:clrMapOvr>
     <a:masterClrMapping/>
   </p:clrMapOvr>
-  <mc:AlternateContent xmlns:mc="http://schemas.openxmlformats.org/markup-compatibility/2006">
-    <mc:Choice xmlns:p14="http://schemas.microsoft.com/office/powerpoint/2010/main" Requires="p14">
+  <mc:AlternateContent xmlns:mc="http://schemas.openxmlformats.org/markup-compatibility/2006" xmlns:p14="http://schemas.microsoft.com/office/powerpoint/2010/main">
+    <mc:Choice Requires="p14">
       <p:transition spd="med" p14:dur="700">
         <p:fade/>
       </p:transition>
     </mc:Choice>
-    <mc:Fallback>
+    <mc:Fallback xmlns="">
       <p:transition spd="med">
         <p:fade/>
       </p:transition>
@@ -5728,12 +5748,21 @@
             <p:ph idx="1"/>
           </p:nvPr>
         </p:nvSpPr>
-        <p:spPr/>
+        <p:spPr>
+          <a:xfrm>
+            <a:off x="1219200" y="2590800"/>
+            <a:ext cx="6629400" cy="2895600"/>
+          </a:xfrm>
+        </p:spPr>
         <p:txBody>
           <a:bodyPr/>
           <a:lstStyle/>
           <a:p>
-            <a:endParaRPr lang="en-US"/>
+            <a:r>
+              <a:rPr lang="en-US" sz="6000" dirty="0" smtClean="0"/>
+              <a:t>Graphic of networking flow goes here</a:t>
+            </a:r>
+            <a:endParaRPr lang="en-US" sz="6000" dirty="0"/>
           </a:p>
         </p:txBody>
       </p:sp>
@@ -5793,13 +5822,13 @@
   <p:clrMapOvr>
     <a:masterClrMapping/>
   </p:clrMapOvr>
-  <mc:AlternateContent xmlns:mc="http://schemas.openxmlformats.org/markup-compatibility/2006">
-    <mc:Choice xmlns:p14="http://schemas.microsoft.com/office/powerpoint/2010/main" Requires="p14">
+  <mc:AlternateContent xmlns:mc="http://schemas.openxmlformats.org/markup-compatibility/2006" xmlns:p14="http://schemas.microsoft.com/office/powerpoint/2010/main">
+    <mc:Choice Requires="p14">
       <p:transition spd="med" p14:dur="700">
         <p:fade/>
       </p:transition>
     </mc:Choice>
-    <mc:Fallback>
+    <mc:Fallback xmlns="">
       <p:transition spd="med">
         <p:fade/>
       </p:transition>
@@ -5891,13 +5920,13 @@
   <p:clrMapOvr>
     <a:masterClrMapping/>
   </p:clrMapOvr>
-  <mc:AlternateContent xmlns:mc="http://schemas.openxmlformats.org/markup-compatibility/2006">
-    <mc:Choice xmlns:p14="http://schemas.microsoft.com/office/powerpoint/2010/main" Requires="p14">
+  <mc:AlternateContent xmlns:mc="http://schemas.openxmlformats.org/markup-compatibility/2006" xmlns:p14="http://schemas.microsoft.com/office/powerpoint/2010/main">
+    <mc:Choice Requires="p14">
       <p:transition spd="med" p14:dur="700" advTm="1123">
         <p:fade/>
       </p:transition>
     </mc:Choice>
-    <mc:Fallback>
+    <mc:Fallback xmlns="">
       <p:transition spd="med" advTm="1123">
         <p:fade/>
       </p:transition>
@@ -5945,7 +5974,17 @@
           <a:bodyPr/>
           <a:lstStyle/>
           <a:p>
-            <a:endParaRPr lang="en-US"/>
+            <a:r>
+              <a:rPr lang="en-US" dirty="0" smtClean="0"/>
+              <a:t>Routing</a:t>
+            </a:r>
+          </a:p>
+          <a:p>
+            <a:r>
+              <a:rPr lang="en-US" dirty="0" smtClean="0"/>
+              <a:t>Network Topology</a:t>
+            </a:r>
+            <a:endParaRPr lang="en-US" dirty="0"/>
           </a:p>
         </p:txBody>
       </p:sp>
@@ -6005,13 +6044,13 @@
   <p:clrMapOvr>
     <a:masterClrMapping/>
   </p:clrMapOvr>
-  <mc:AlternateContent xmlns:mc="http://schemas.openxmlformats.org/markup-compatibility/2006">
-    <mc:Choice xmlns:p14="http://schemas.microsoft.com/office/powerpoint/2010/main" Requires="p14">
+  <mc:AlternateContent xmlns:mc="http://schemas.openxmlformats.org/markup-compatibility/2006" xmlns:p14="http://schemas.microsoft.com/office/powerpoint/2010/main">
+    <mc:Choice Requires="p14">
       <p:transition spd="med" p14:dur="700">
         <p:fade/>
       </p:transition>
     </mc:Choice>
-    <mc:Fallback>
+    <mc:Fallback xmlns="">
       <p:transition spd="med">
         <p:fade/>
       </p:transition>
@@ -6052,7 +6091,25 @@
           <a:bodyPr/>
           <a:lstStyle/>
           <a:p>
-            <a:endParaRPr lang="en-US"/>
+            <a:r>
+              <a:rPr lang="en-US" dirty="0" smtClean="0"/>
+              <a:t>Single point of failure</a:t>
+            </a:r>
+          </a:p>
+          <a:p>
+            <a:r>
+              <a:rPr lang="en-US" dirty="0" smtClean="0"/>
+              <a:t>Finding a viable, scalable, universal protocol for all switches/ controllers to talk through (currently </a:t>
+            </a:r>
+            <a:r>
+              <a:rPr lang="en-US" dirty="0" err="1" smtClean="0"/>
+              <a:t>OpenFlow</a:t>
+            </a:r>
+            <a:r>
+              <a:rPr lang="en-US" smtClean="0"/>
+              <a:t>, but it is weird)</a:t>
+            </a:r>
+            <a:endParaRPr lang="en-US" dirty="0"/>
           </a:p>
         </p:txBody>
       </p:sp>
@@ -6112,13 +6169,13 @@
   <p:clrMapOvr>
     <a:masterClrMapping/>
   </p:clrMapOvr>
-  <mc:AlternateContent xmlns:mc="http://schemas.openxmlformats.org/markup-compatibility/2006">
-    <mc:Choice xmlns:p14="http://schemas.microsoft.com/office/powerpoint/2010/main" Requires="p14">
+  <mc:AlternateContent xmlns:mc="http://schemas.openxmlformats.org/markup-compatibility/2006" xmlns:p14="http://schemas.microsoft.com/office/powerpoint/2010/main">
+    <mc:Choice Requires="p14">
       <p:transition spd="med" p14:dur="700">
         <p:fade/>
       </p:transition>
     </mc:Choice>
-    <mc:Fallback>
+    <mc:Fallback xmlns="">
       <p:transition spd="med">
         <p:fade/>
       </p:transition>
@@ -6146,25 +6203,6 @@
       </p:grpSpPr>
       <p:sp>
         <p:nvSpPr>
-          <p:cNvPr id="2" name="Content Placeholder 1"/>
-          <p:cNvSpPr>
-            <a:spLocks noGrp="1"/>
-          </p:cNvSpPr>
-          <p:nvPr>
-            <p:ph idx="1"/>
-          </p:nvPr>
-        </p:nvSpPr>
-        <p:spPr/>
-        <p:txBody>
-          <a:bodyPr/>
-          <a:lstStyle/>
-          <a:p>
-            <a:endParaRPr lang="en-US"/>
-          </a:p>
-        </p:txBody>
-      </p:sp>
-      <p:sp>
-        <p:nvSpPr>
           <p:cNvPr id="3" name="Title 2"/>
           <p:cNvSpPr>
             <a:spLocks noGrp="1"/>
@@ -6235,6 +6273,34 @@
           </a:p>
         </p:txBody>
       </p:sp>
+      <p:sp>
+        <p:nvSpPr>
+          <p:cNvPr id="6" name="Content Placeholder 1"/>
+          <p:cNvSpPr>
+            <a:spLocks noGrp="1"/>
+          </p:cNvSpPr>
+          <p:nvPr>
+            <p:ph idx="1"/>
+          </p:nvPr>
+        </p:nvSpPr>
+        <p:spPr>
+          <a:xfrm>
+            <a:off x="1219200" y="2590800"/>
+            <a:ext cx="6629400" cy="2895600"/>
+          </a:xfrm>
+        </p:spPr>
+        <p:txBody>
+          <a:bodyPr/>
+          <a:lstStyle/>
+          <a:p>
+            <a:r>
+              <a:rPr lang="en-US" sz="6000" dirty="0" smtClean="0"/>
+              <a:t>Graphic of networking flow goes here</a:t>
+            </a:r>
+            <a:endParaRPr lang="en-US" sz="6000" dirty="0"/>
+          </a:p>
+        </p:txBody>
+      </p:sp>
     </p:spTree>
     <p:extLst>
       <p:ext uri="{BB962C8B-B14F-4D97-AF65-F5344CB8AC3E}">
@@ -6245,13 +6311,13 @@
   <p:clrMapOvr>
     <a:masterClrMapping/>
   </p:clrMapOvr>
-  <mc:AlternateContent xmlns:mc="http://schemas.openxmlformats.org/markup-compatibility/2006">
-    <mc:Choice xmlns:p14="http://schemas.microsoft.com/office/powerpoint/2010/main" Requires="p14">
+  <mc:AlternateContent xmlns:mc="http://schemas.openxmlformats.org/markup-compatibility/2006" xmlns:p14="http://schemas.microsoft.com/office/powerpoint/2010/main">
+    <mc:Choice Requires="p14">
       <p:transition spd="med" p14:dur="700">
         <p:fade/>
       </p:transition>
     </mc:Choice>
-    <mc:Fallback>
+    <mc:Fallback xmlns="">
       <p:transition spd="med">
         <p:fade/>
       </p:transition>

</xml_diff>

<commit_message>
specified where SDN and OpenFlow are defined
</commit_message>
<xml_diff>
--- a/survey topic/SDNOpenFlow.pptx
+++ b/survey topic/SDNOpenFlow.pptx
@@ -5976,6 +5976,12 @@
           <a:p>
             <a:r>
               <a:rPr lang="en-US" dirty="0" smtClean="0"/>
+              <a:t>Define SDN</a:t>
+            </a:r>
+          </a:p>
+          <a:p>
+            <a:r>
+              <a:rPr lang="en-US" dirty="0" smtClean="0"/>
               <a:t>Routing</a:t>
             </a:r>
           </a:p>
@@ -6107,7 +6113,7 @@
             </a:r>
             <a:r>
               <a:rPr lang="en-US" smtClean="0"/>
-              <a:t>, but it is weird)</a:t>
+              <a:t>, Define it)</a:t>
             </a:r>
             <a:endParaRPr lang="en-US" dirty="0"/>
           </a:p>

</xml_diff>